<commit_message>
finalised ABS topic modelling solution, packaged as a daemon service
</commit_message>
<xml_diff>
--- a/Project 1576 idea outline.pptx
+++ b/Project 1576 idea outline.pptx
@@ -6,7 +6,6 @@
   </p:sldMasterIdLst>
   <p:sldIdLst>
     <p:sldId id="256" r:id="rId2"/>
-    <p:sldId id="257" r:id="rId3"/>
   </p:sldIdLst>
   <p:sldSz cx="12192000" cy="6858000"/>
   <p:notesSz cx="6858000" cy="9144000"/>
@@ -3362,7 +3361,7 @@
         </p:nvSpPr>
         <p:spPr>
           <a:xfrm>
-            <a:off x="0" y="0"/>
+            <a:off x="-26050" y="38425"/>
             <a:ext cx="12192000" cy="6764215"/>
           </a:xfrm>
           <a:prstGeom prst="rect">
@@ -3572,7 +3571,7 @@
         </p:nvSpPr>
         <p:spPr>
           <a:xfrm>
-            <a:off x="82062" y="2215660"/>
+            <a:off x="57964" y="3263410"/>
             <a:ext cx="2414954" cy="1184031"/>
           </a:xfrm>
           <a:prstGeom prst="rect">
@@ -3626,8 +3625,8 @@
         </p:nvSpPr>
         <p:spPr>
           <a:xfrm rot="5400000">
-            <a:off x="905608" y="1471245"/>
-            <a:ext cx="767861" cy="550985"/>
+            <a:off x="408841" y="1968011"/>
+            <a:ext cx="1761393" cy="550985"/>
           </a:xfrm>
           <a:prstGeom prst="rightArrow">
             <a:avLst/>
@@ -3672,7 +3671,7 @@
         </p:nvSpPr>
         <p:spPr>
           <a:xfrm>
-            <a:off x="3358663" y="2215659"/>
+            <a:off x="3332285" y="1970942"/>
             <a:ext cx="2414954" cy="1184031"/>
           </a:xfrm>
           <a:prstGeom prst="rect">
@@ -3726,8 +3725,8 @@
         </p:nvSpPr>
         <p:spPr>
           <a:xfrm rot="5400000">
-            <a:off x="4111870" y="1471245"/>
-            <a:ext cx="767861" cy="550985"/>
+            <a:off x="4212003" y="1371111"/>
+            <a:ext cx="567593" cy="550985"/>
           </a:xfrm>
           <a:prstGeom prst="rightArrow">
             <a:avLst/>
@@ -3772,7 +3771,7 @@
         </p:nvSpPr>
         <p:spPr>
           <a:xfrm>
-            <a:off x="9659818" y="2159974"/>
+            <a:off x="9659818" y="2083934"/>
             <a:ext cx="2414954" cy="1184031"/>
           </a:xfrm>
           <a:prstGeom prst="rect">
@@ -3828,7 +3827,7 @@
         </p:nvSpPr>
         <p:spPr>
           <a:xfrm rot="10800000">
-            <a:off x="8845064" y="2505804"/>
+            <a:off x="8851658" y="2337676"/>
             <a:ext cx="767861" cy="550985"/>
           </a:xfrm>
           <a:prstGeom prst="rightArrow">
@@ -3874,7 +3873,7 @@
         </p:nvSpPr>
         <p:spPr>
           <a:xfrm>
-            <a:off x="6383217" y="2189282"/>
+            <a:off x="6396406" y="1945765"/>
             <a:ext cx="2414954" cy="1184031"/>
           </a:xfrm>
           <a:prstGeom prst="rect">
@@ -4028,7 +4027,7 @@
         </p:nvSpPr>
         <p:spPr>
           <a:xfrm>
-            <a:off x="5794132" y="2674329"/>
+            <a:off x="5785665" y="2505804"/>
             <a:ext cx="568570" cy="360482"/>
           </a:xfrm>
           <a:prstGeom prst="leftRightArrow">
@@ -4074,7 +4073,7 @@
         </p:nvSpPr>
         <p:spPr>
           <a:xfrm>
-            <a:off x="4870939" y="3575533"/>
+            <a:off x="3634239" y="3640738"/>
             <a:ext cx="2414954" cy="638913"/>
           </a:xfrm>
           <a:prstGeom prst="rect">
@@ -4128,7 +4127,7 @@
         </p:nvSpPr>
         <p:spPr>
           <a:xfrm rot="5400000">
-            <a:off x="5685694" y="4419596"/>
+            <a:off x="4827713" y="4484802"/>
             <a:ext cx="767861" cy="550985"/>
           </a:xfrm>
           <a:prstGeom prst="rightArrow">
@@ -4174,7 +4173,7 @@
         </p:nvSpPr>
         <p:spPr>
           <a:xfrm>
-            <a:off x="3346941" y="5185990"/>
+            <a:off x="3076057" y="5354141"/>
             <a:ext cx="4185138" cy="1345229"/>
           </a:xfrm>
           <a:prstGeom prst="rect">
@@ -4228,13 +4227,17 @@
         </p:nvSpPr>
         <p:spPr>
           <a:xfrm>
-            <a:off x="6954716" y="4463547"/>
-            <a:ext cx="2414954" cy="638913"/>
+            <a:off x="6354235" y="3478056"/>
+            <a:ext cx="2881353" cy="1527825"/>
           </a:xfrm>
           <a:prstGeom prst="rect">
             <a:avLst/>
           </a:prstGeom>
-          <a:noFill/>
+          <a:solidFill>
+            <a:schemeClr val="accent6">
+              <a:lumMod val="50000"/>
+            </a:schemeClr>
+          </a:solidFill>
         </p:spPr>
         <p:style>
           <a:lnRef idx="2">
@@ -4263,7 +4266,7 @@
                   <a:schemeClr val="tx1"/>
                 </a:solidFill>
               </a:rPr>
-              <a:t>Generate location-based insights</a:t>
+              <a:t>Generate time-resolved real-time insights on alignment of government priorities to citizens’ priorities</a:t>
             </a:r>
           </a:p>
         </p:txBody>
@@ -4282,7 +4285,7 @@
         </p:nvSpPr>
         <p:spPr>
           <a:xfrm>
-            <a:off x="9270025" y="4695088"/>
+            <a:off x="9163418" y="4666228"/>
             <a:ext cx="568570" cy="360482"/>
           </a:xfrm>
           <a:prstGeom prst="leftRightArrow">
@@ -4328,7 +4331,7 @@
         </p:nvSpPr>
         <p:spPr>
           <a:xfrm rot="5400000">
-            <a:off x="6886579" y="4955182"/>
+            <a:off x="6881737" y="5018606"/>
             <a:ext cx="568570" cy="360482"/>
           </a:xfrm>
           <a:prstGeom prst="leftRightArrow">
@@ -4374,7 +4377,7 @@
         </p:nvSpPr>
         <p:spPr>
           <a:xfrm rot="5400000">
-            <a:off x="8221176" y="5307595"/>
+            <a:off x="7410449" y="3156990"/>
             <a:ext cx="568570" cy="360482"/>
           </a:xfrm>
           <a:prstGeom prst="leftRightArrow">
@@ -4420,8 +4423,8 @@
         </p:nvSpPr>
         <p:spPr>
           <a:xfrm>
-            <a:off x="7785591" y="5870304"/>
-            <a:ext cx="2968868" cy="638913"/>
+            <a:off x="5846976" y="98727"/>
+            <a:ext cx="3195423" cy="1179087"/>
           </a:xfrm>
           <a:prstGeom prst="rect">
             <a:avLst/>
@@ -4455,47 +4458,17 @@
                   <a:schemeClr val="tx1"/>
                 </a:solidFill>
               </a:rPr>
-              <a:t>Enrich insights with location-based ABS data!</a:t>
-            </a:r>
-          </a:p>
-        </p:txBody>
-      </p:sp>
-    </p:spTree>
-    <p:extLst>
-      <p:ext uri="{BB962C8B-B14F-4D97-AF65-F5344CB8AC3E}">
-        <p14:creationId xmlns:p14="http://schemas.microsoft.com/office/powerpoint/2010/main" val="2208917522"/>
-      </p:ext>
-    </p:extLst>
-  </p:cSld>
-  <p:clrMapOvr>
-    <a:masterClrMapping/>
-  </p:clrMapOvr>
-</p:sld>
-</file>
-
-<file path=ppt/slides/slide2.xml><?xml version="1.0" encoding="utf-8"?>
-<p:sld xmlns:a="http://schemas.openxmlformats.org/drawingml/2006/main" xmlns:r="http://schemas.openxmlformats.org/officeDocument/2006/relationships" xmlns:p="http://schemas.openxmlformats.org/presentationml/2006/main">
-  <p:cSld>
-    <p:spTree>
-      <p:nvGrpSpPr>
-        <p:cNvPr id="1" name=""/>
-        <p:cNvGrpSpPr/>
-        <p:nvPr/>
-      </p:nvGrpSpPr>
-      <p:grpSpPr>
-        <a:xfrm>
-          <a:off x="0" y="0"/>
-          <a:ext cx="0" cy="0"/>
-          <a:chOff x="0" y="0"/>
-          <a:chExt cx="0" cy="0"/>
-        </a:xfrm>
-      </p:grpSpPr>
-      <p:sp>
-        <p:nvSpPr>
-          <p:cNvPr id="4" name="Rectangle 3">
-            <a:extLst>
-              <a:ext uri="{FF2B5EF4-FFF2-40B4-BE49-F238E27FC236}">
-                <a16:creationId xmlns:a16="http://schemas.microsoft.com/office/drawing/2014/main" id="{86C181E2-D240-4D51-8A09-D14A981E5911}"/>
+              <a:t>Construct NLP hypotheses from ABS survey and test them against streaming live  data!</a:t>
+            </a:r>
+          </a:p>
+        </p:txBody>
+      </p:sp>
+      <p:sp>
+        <p:nvSpPr>
+          <p:cNvPr id="26" name="Arrow: Left-Right 25">
+            <a:extLst>
+              <a:ext uri="{FF2B5EF4-FFF2-40B4-BE49-F238E27FC236}">
+                <a16:creationId xmlns:a16="http://schemas.microsoft.com/office/drawing/2014/main" id="{F28BB1AD-2CCA-4D56-ACE6-E53042B990B3}"/>
               </a:ext>
             </a:extLst>
           </p:cNvPr>
@@ -4504,20 +4477,12 @@
         </p:nvSpPr>
         <p:spPr>
           <a:xfrm>
-            <a:off x="279400" y="186267"/>
-            <a:ext cx="11311467" cy="6493933"/>
-          </a:xfrm>
-          <a:prstGeom prst="rect">
+            <a:off x="2643553" y="3714748"/>
+            <a:ext cx="912447" cy="360482"/>
+          </a:xfrm>
+          <a:prstGeom prst="leftRightArrow">
             <a:avLst/>
           </a:prstGeom>
-          <a:solidFill>
-            <a:schemeClr val="bg1"/>
-          </a:solidFill>
-          <a:ln>
-            <a:solidFill>
-              <a:schemeClr val="bg1"/>
-            </a:solidFill>
-          </a:ln>
         </p:spPr>
         <p:style>
           <a:lnRef idx="2">
@@ -4544,10 +4509,254 @@
           </a:p>
         </p:txBody>
       </p:sp>
+      <p:sp>
+        <p:nvSpPr>
+          <p:cNvPr id="27" name="Rectangle 26">
+            <a:extLst>
+              <a:ext uri="{FF2B5EF4-FFF2-40B4-BE49-F238E27FC236}">
+                <a16:creationId xmlns:a16="http://schemas.microsoft.com/office/drawing/2014/main" id="{2B07395E-B3EC-4B94-866A-FCD0DC3D8AC5}"/>
+              </a:ext>
+            </a:extLst>
+          </p:cNvPr>
+          <p:cNvSpPr/>
+          <p:nvPr/>
+        </p:nvSpPr>
+        <p:spPr>
+          <a:xfrm>
+            <a:off x="9646552" y="154175"/>
+            <a:ext cx="2414954" cy="1184031"/>
+          </a:xfrm>
+          <a:prstGeom prst="rect">
+            <a:avLst/>
+          </a:prstGeom>
+          <a:solidFill>
+            <a:srgbClr val="00B0F0"/>
+          </a:solidFill>
+        </p:spPr>
+        <p:style>
+          <a:lnRef idx="2">
+            <a:schemeClr val="accent1">
+              <a:shade val="50000"/>
+            </a:schemeClr>
+          </a:lnRef>
+          <a:fillRef idx="1">
+            <a:schemeClr val="accent1"/>
+          </a:fillRef>
+          <a:effectRef idx="0">
+            <a:schemeClr val="accent1"/>
+          </a:effectRef>
+          <a:fontRef idx="minor">
+            <a:schemeClr val="lt1"/>
+          </a:fontRef>
+        </p:style>
+        <p:txBody>
+          <a:bodyPr rtlCol="0" anchor="ctr"/>
+          <a:lstStyle/>
+          <a:p>
+            <a:pPr algn="ctr"/>
+            <a:r>
+              <a:rPr lang="en-US" dirty="0">
+                <a:solidFill>
+                  <a:schemeClr val="tx1"/>
+                </a:solidFill>
+              </a:rPr>
+              <a:t>Ask citizens (users) what are things they care about</a:t>
+            </a:r>
+          </a:p>
+        </p:txBody>
+      </p:sp>
+      <p:sp>
+        <p:nvSpPr>
+          <p:cNvPr id="28" name="Arrow: Right 27">
+            <a:extLst>
+              <a:ext uri="{FF2B5EF4-FFF2-40B4-BE49-F238E27FC236}">
+                <a16:creationId xmlns:a16="http://schemas.microsoft.com/office/drawing/2014/main" id="{AE2029F4-D1A8-444C-BFB9-4B2345829396}"/>
+              </a:ext>
+            </a:extLst>
+          </p:cNvPr>
+          <p:cNvSpPr/>
+          <p:nvPr/>
+        </p:nvSpPr>
+        <p:spPr>
+          <a:xfrm rot="10800000">
+            <a:off x="9103505" y="470697"/>
+            <a:ext cx="481940" cy="550985"/>
+          </a:xfrm>
+          <a:prstGeom prst="rightArrow">
+            <a:avLst/>
+          </a:prstGeom>
+        </p:spPr>
+        <p:style>
+          <a:lnRef idx="2">
+            <a:schemeClr val="accent1">
+              <a:shade val="50000"/>
+            </a:schemeClr>
+          </a:lnRef>
+          <a:fillRef idx="1">
+            <a:schemeClr val="accent1"/>
+          </a:fillRef>
+          <a:effectRef idx="0">
+            <a:schemeClr val="accent1"/>
+          </a:effectRef>
+          <a:fontRef idx="minor">
+            <a:schemeClr val="lt1"/>
+          </a:fontRef>
+        </p:style>
+        <p:txBody>
+          <a:bodyPr rtlCol="0" anchor="ctr"/>
+          <a:lstStyle/>
+          <a:p>
+            <a:pPr algn="ctr"/>
+            <a:endParaRPr lang="en-AU"/>
+          </a:p>
+        </p:txBody>
+      </p:sp>
+      <p:sp>
+        <p:nvSpPr>
+          <p:cNvPr id="29" name="Arrow: Left-Right 28">
+            <a:extLst>
+              <a:ext uri="{FF2B5EF4-FFF2-40B4-BE49-F238E27FC236}">
+                <a16:creationId xmlns:a16="http://schemas.microsoft.com/office/drawing/2014/main" id="{A5AFB133-1E5B-483A-8EFB-E48F75948A4F}"/>
+              </a:ext>
+            </a:extLst>
+          </p:cNvPr>
+          <p:cNvSpPr/>
+          <p:nvPr/>
+        </p:nvSpPr>
+        <p:spPr>
+          <a:xfrm rot="10800000">
+            <a:off x="5519885" y="597110"/>
+            <a:ext cx="568570" cy="360482"/>
+          </a:xfrm>
+          <a:prstGeom prst="leftRightArrow">
+            <a:avLst/>
+          </a:prstGeom>
+        </p:spPr>
+        <p:style>
+          <a:lnRef idx="2">
+            <a:schemeClr val="accent1">
+              <a:shade val="50000"/>
+            </a:schemeClr>
+          </a:lnRef>
+          <a:fillRef idx="1">
+            <a:schemeClr val="accent1"/>
+          </a:fillRef>
+          <a:effectRef idx="0">
+            <a:schemeClr val="accent1"/>
+          </a:effectRef>
+          <a:fontRef idx="minor">
+            <a:schemeClr val="lt1"/>
+          </a:fontRef>
+        </p:style>
+        <p:txBody>
+          <a:bodyPr rtlCol="0" anchor="ctr"/>
+          <a:lstStyle/>
+          <a:p>
+            <a:pPr algn="ctr"/>
+            <a:endParaRPr lang="en-AU"/>
+          </a:p>
+        </p:txBody>
+      </p:sp>
+      <p:sp>
+        <p:nvSpPr>
+          <p:cNvPr id="30" name="Arrow: Left-Right 29">
+            <a:extLst>
+              <a:ext uri="{FF2B5EF4-FFF2-40B4-BE49-F238E27FC236}">
+                <a16:creationId xmlns:a16="http://schemas.microsoft.com/office/drawing/2014/main" id="{E2E81440-2AF7-45E3-AB5B-E2BC1F0E0177}"/>
+              </a:ext>
+            </a:extLst>
+          </p:cNvPr>
+          <p:cNvSpPr/>
+          <p:nvPr/>
+        </p:nvSpPr>
+        <p:spPr>
+          <a:xfrm rot="5400000">
+            <a:off x="7070516" y="1486480"/>
+            <a:ext cx="911976" cy="360482"/>
+          </a:xfrm>
+          <a:prstGeom prst="leftRightArrow">
+            <a:avLst/>
+          </a:prstGeom>
+        </p:spPr>
+        <p:style>
+          <a:lnRef idx="2">
+            <a:schemeClr val="accent1">
+              <a:shade val="50000"/>
+            </a:schemeClr>
+          </a:lnRef>
+          <a:fillRef idx="1">
+            <a:schemeClr val="accent1"/>
+          </a:fillRef>
+          <a:effectRef idx="0">
+            <a:schemeClr val="accent1"/>
+          </a:effectRef>
+          <a:fontRef idx="minor">
+            <a:schemeClr val="lt1"/>
+          </a:fontRef>
+        </p:style>
+        <p:txBody>
+          <a:bodyPr rtlCol="0" anchor="ctr"/>
+          <a:lstStyle/>
+          <a:p>
+            <a:pPr algn="ctr"/>
+            <a:endParaRPr lang="en-AU"/>
+          </a:p>
+        </p:txBody>
+      </p:sp>
+      <p:sp>
+        <p:nvSpPr>
+          <p:cNvPr id="2" name="Callout: Up Arrow 1">
+            <a:extLst>
+              <a:ext uri="{FF2B5EF4-FFF2-40B4-BE49-F238E27FC236}">
+                <a16:creationId xmlns:a16="http://schemas.microsoft.com/office/drawing/2014/main" id="{D0ABB39F-F449-4C53-8F96-FD14E87F3039}"/>
+              </a:ext>
+            </a:extLst>
+          </p:cNvPr>
+          <p:cNvSpPr/>
+          <p:nvPr/>
+        </p:nvSpPr>
+        <p:spPr>
+          <a:xfrm>
+            <a:off x="7450667" y="5065320"/>
+            <a:ext cx="2031999" cy="1634050"/>
+          </a:xfrm>
+          <a:prstGeom prst="upArrowCallout">
+            <a:avLst/>
+          </a:prstGeom>
+        </p:spPr>
+        <p:style>
+          <a:lnRef idx="2">
+            <a:schemeClr val="accent1">
+              <a:shade val="50000"/>
+            </a:schemeClr>
+          </a:lnRef>
+          <a:fillRef idx="1">
+            <a:schemeClr val="accent1"/>
+          </a:fillRef>
+          <a:effectRef idx="0">
+            <a:schemeClr val="accent1"/>
+          </a:effectRef>
+          <a:fontRef idx="minor">
+            <a:schemeClr val="lt1"/>
+          </a:fontRef>
+        </p:style>
+        <p:txBody>
+          <a:bodyPr rtlCol="0" anchor="ctr"/>
+          <a:lstStyle/>
+          <a:p>
+            <a:pPr algn="ctr"/>
+            <a:r>
+              <a:rPr lang="en-US" dirty="0"/>
+              <a:t>Notify user of new findings / serve through the portal</a:t>
+            </a:r>
+            <a:endParaRPr lang="en-AU" dirty="0"/>
+          </a:p>
+        </p:txBody>
+      </p:sp>
     </p:spTree>
     <p:extLst>
       <p:ext uri="{BB962C8B-B14F-4D97-AF65-F5344CB8AC3E}">
-        <p14:creationId xmlns:p14="http://schemas.microsoft.com/office/powerpoint/2010/main" val="1916474786"/>
+        <p14:creationId xmlns:p14="http://schemas.microsoft.com/office/powerpoint/2010/main" val="2208917522"/>
       </p:ext>
     </p:extLst>
   </p:cSld>

</xml_diff>